<commit_message>
fixed function entry but need to fix returning from if statement
</commit_message>
<xml_diff>
--- a/Archives/Compiler final presentation.pptx
+++ b/Archives/Compiler final presentation.pptx
@@ -197,7 +197,7 @@
           <a:p>
             <a:fld id="{5C19CA1D-CA43-C842-9683-4F6E03657CE3}" type="datetimeFigureOut">
               <a:rPr lang="en-US" smtClean="0"/>
-              <a:t>5/8/12</a:t>
+              <a:t>6/26/12</a:t>
             </a:fld>
             <a:endParaRPr lang="en-US"/>
           </a:p>
@@ -734,7 +734,7 @@
           <a:p>
             <a:fld id="{B01F9CA3-105E-4857-9057-6DB6197DA786}" type="datetimeFigureOut">
               <a:rPr lang="en-US" smtClean="0"/>
-              <a:t>5/8/12</a:t>
+              <a:t>6/26/12</a:t>
             </a:fld>
             <a:endParaRPr lang="en-US"/>
           </a:p>
@@ -904,7 +904,7 @@
           <a:p>
             <a:fld id="{B01F9CA3-105E-4857-9057-6DB6197DA786}" type="datetimeFigureOut">
               <a:rPr lang="en-US" smtClean="0"/>
-              <a:t>5/8/12</a:t>
+              <a:t>6/26/12</a:t>
             </a:fld>
             <a:endParaRPr lang="en-US"/>
           </a:p>
@@ -1084,7 +1084,7 @@
           <a:p>
             <a:fld id="{B01F9CA3-105E-4857-9057-6DB6197DA786}" type="datetimeFigureOut">
               <a:rPr lang="en-US" smtClean="0"/>
-              <a:t>5/8/12</a:t>
+              <a:t>6/26/12</a:t>
             </a:fld>
             <a:endParaRPr lang="en-US"/>
           </a:p>
@@ -1254,7 +1254,7 @@
           <a:p>
             <a:fld id="{B01F9CA3-105E-4857-9057-6DB6197DA786}" type="datetimeFigureOut">
               <a:rPr lang="en-US" smtClean="0"/>
-              <a:t>5/8/12</a:t>
+              <a:t>6/26/12</a:t>
             </a:fld>
             <a:endParaRPr lang="en-US"/>
           </a:p>
@@ -1500,7 +1500,7 @@
           <a:p>
             <a:fld id="{B01F9CA3-105E-4857-9057-6DB6197DA786}" type="datetimeFigureOut">
               <a:rPr lang="en-US" smtClean="0"/>
-              <a:t>5/8/12</a:t>
+              <a:t>6/26/12</a:t>
             </a:fld>
             <a:endParaRPr lang="en-US"/>
           </a:p>
@@ -1788,7 +1788,7 @@
           <a:p>
             <a:fld id="{B01F9CA3-105E-4857-9057-6DB6197DA786}" type="datetimeFigureOut">
               <a:rPr lang="en-US" smtClean="0"/>
-              <a:t>5/8/12</a:t>
+              <a:t>6/26/12</a:t>
             </a:fld>
             <a:endParaRPr lang="en-US"/>
           </a:p>
@@ -2210,7 +2210,7 @@
           <a:p>
             <a:fld id="{B01F9CA3-105E-4857-9057-6DB6197DA786}" type="datetimeFigureOut">
               <a:rPr lang="en-US" smtClean="0"/>
-              <a:t>5/8/12</a:t>
+              <a:t>6/26/12</a:t>
             </a:fld>
             <a:endParaRPr lang="en-US"/>
           </a:p>
@@ -2328,7 +2328,7 @@
           <a:p>
             <a:fld id="{B01F9CA3-105E-4857-9057-6DB6197DA786}" type="datetimeFigureOut">
               <a:rPr lang="en-US" smtClean="0"/>
-              <a:t>5/8/12</a:t>
+              <a:t>6/26/12</a:t>
             </a:fld>
             <a:endParaRPr lang="en-US"/>
           </a:p>
@@ -2423,7 +2423,7 @@
           <a:p>
             <a:fld id="{B01F9CA3-105E-4857-9057-6DB6197DA786}" type="datetimeFigureOut">
               <a:rPr lang="en-US" smtClean="0"/>
-              <a:t>5/8/12</a:t>
+              <a:t>6/26/12</a:t>
             </a:fld>
             <a:endParaRPr lang="en-US"/>
           </a:p>
@@ -2700,7 +2700,7 @@
           <a:p>
             <a:fld id="{B01F9CA3-105E-4857-9057-6DB6197DA786}" type="datetimeFigureOut">
               <a:rPr lang="en-US" smtClean="0"/>
-              <a:t>5/8/12</a:t>
+              <a:t>6/26/12</a:t>
             </a:fld>
             <a:endParaRPr lang="en-US"/>
           </a:p>
@@ -2953,7 +2953,7 @@
           <a:p>
             <a:fld id="{B01F9CA3-105E-4857-9057-6DB6197DA786}" type="datetimeFigureOut">
               <a:rPr lang="en-US" smtClean="0"/>
-              <a:t>5/8/12</a:t>
+              <a:t>6/26/12</a:t>
             </a:fld>
             <a:endParaRPr lang="en-US"/>
           </a:p>
@@ -3166,7 +3166,7 @@
           <a:p>
             <a:fld id="{B01F9CA3-105E-4857-9057-6DB6197DA786}" type="datetimeFigureOut">
               <a:rPr lang="en-US" smtClean="0"/>
-              <a:t>5/8/12</a:t>
+              <a:t>6/26/12</a:t>
             </a:fld>
             <a:endParaRPr lang="en-US"/>
           </a:p>
@@ -4046,7 +4046,7 @@
         <p:spPr/>
         <p:txBody>
           <a:bodyPr>
-            <a:normAutofit/>
+            <a:normAutofit fontScale="92500" lnSpcReduction="10000"/>
           </a:bodyPr>
           <a:lstStyle/>
           <a:p>
@@ -4095,145 +4095,201 @@
               <a:rPr lang="en-US" sz="2400" dirty="0" smtClean="0"/>
               <a:t>Union data</a:t>
             </a:r>
+            <a:endParaRPr lang="en-US" sz="1900" dirty="0" smtClean="0"/>
           </a:p>
           <a:p>
             <a:pPr lvl="1"/>
             <a:r>
-              <a:rPr lang="en-US" sz="2000" dirty="0" smtClean="0"/>
+              <a:rPr lang="en-US" sz="1900" dirty="0" smtClean="0"/>
               <a:t>Op: </a:t>
             </a:r>
             <a:r>
-              <a:rPr lang="en-US" sz="2000" dirty="0" err="1" smtClean="0"/>
+              <a:rPr lang="en-US" sz="1900" dirty="0" err="1" smtClean="0"/>
               <a:t>rd</a:t>
             </a:r>
             <a:r>
-              <a:rPr lang="en-US" sz="2000" dirty="0" smtClean="0"/>
+              <a:rPr lang="en-US" sz="1900" dirty="0" smtClean="0"/>
               <a:t> (temp), </a:t>
             </a:r>
             <a:r>
-              <a:rPr lang="en-US" sz="2000" dirty="0" err="1" smtClean="0"/>
+              <a:rPr lang="en-US" sz="1900" dirty="0" err="1" smtClean="0"/>
               <a:t>rs</a:t>
             </a:r>
             <a:r>
-              <a:rPr lang="en-US" sz="2000" dirty="0" smtClean="0"/>
+              <a:rPr lang="en-US" sz="1900" dirty="0" smtClean="0"/>
               <a:t> (temp), </a:t>
             </a:r>
             <a:r>
-              <a:rPr lang="en-US" sz="2000" dirty="0" err="1" smtClean="0"/>
+              <a:rPr lang="en-US" sz="1900" dirty="0" err="1" smtClean="0"/>
               <a:t>rt</a:t>
             </a:r>
             <a:r>
-              <a:rPr lang="en-US" sz="2000" dirty="0" smtClean="0"/>
+              <a:rPr lang="en-US" sz="1900" dirty="0" smtClean="0"/>
               <a:t> (temp)</a:t>
             </a:r>
           </a:p>
           <a:p>
             <a:pPr lvl="1"/>
             <a:r>
-              <a:rPr lang="en-US" sz="2000" dirty="0" smtClean="0"/>
+              <a:rPr lang="en-US" sz="1900" dirty="0" smtClean="0"/>
               <a:t>Load: </a:t>
             </a:r>
             <a:r>
-              <a:rPr lang="en-US" sz="2000" dirty="0" err="1" smtClean="0"/>
+              <a:rPr lang="en-US" sz="1900" dirty="0" err="1" smtClean="0"/>
               <a:t>rd</a:t>
             </a:r>
             <a:r>
-              <a:rPr lang="en-US" sz="2000" dirty="0"/>
+              <a:rPr lang="en-US" sz="1900" dirty="0"/>
               <a:t> </a:t>
             </a:r>
             <a:r>
-              <a:rPr lang="en-US" sz="2000" dirty="0" smtClean="0"/>
+              <a:rPr lang="en-US" sz="1900" dirty="0" smtClean="0"/>
               <a:t>(temp), </a:t>
             </a:r>
             <a:r>
-              <a:rPr lang="en-US" sz="2000" dirty="0" err="1" smtClean="0"/>
+              <a:rPr lang="en-US" sz="1900" dirty="0" err="1" smtClean="0"/>
               <a:t>rs</a:t>
             </a:r>
             <a:r>
-              <a:rPr lang="en-US" sz="2000" dirty="0" smtClean="0"/>
+              <a:rPr lang="en-US" sz="1900" dirty="0" smtClean="0"/>
               <a:t> (identifier)</a:t>
             </a:r>
           </a:p>
           <a:p>
             <a:pPr lvl="1"/>
             <a:r>
-              <a:rPr lang="en-US" sz="2000" dirty="0" smtClean="0"/>
+              <a:rPr lang="en-US" sz="1900" dirty="0" smtClean="0"/>
               <a:t>Store: </a:t>
             </a:r>
             <a:r>
-              <a:rPr lang="en-US" sz="2000" dirty="0" err="1" smtClean="0"/>
+              <a:rPr lang="en-US" sz="1900" dirty="0" err="1" smtClean="0"/>
               <a:t>rs</a:t>
             </a:r>
             <a:r>
-              <a:rPr lang="en-US" sz="2000" dirty="0" smtClean="0"/>
+              <a:rPr lang="en-US" sz="1900" dirty="0" smtClean="0"/>
               <a:t> (temp), </a:t>
             </a:r>
             <a:r>
-              <a:rPr lang="en-US" sz="2000" dirty="0" err="1" smtClean="0"/>
+              <a:rPr lang="en-US" sz="1900" dirty="0" err="1" smtClean="0"/>
               <a:t>rd</a:t>
             </a:r>
             <a:r>
-              <a:rPr lang="en-US" sz="2000" dirty="0" smtClean="0"/>
+              <a:rPr lang="en-US" sz="1900" dirty="0" smtClean="0"/>
               <a:t> (identifier)</a:t>
             </a:r>
           </a:p>
           <a:p>
             <a:pPr lvl="1"/>
             <a:r>
-              <a:rPr lang="en-US" sz="2000" dirty="0" err="1" smtClean="0"/>
+              <a:rPr lang="en-US" sz="1900" dirty="0" err="1" smtClean="0"/>
               <a:t>Load_const</a:t>
             </a:r>
             <a:r>
-              <a:rPr lang="en-US" sz="2000" dirty="0" smtClean="0"/>
+              <a:rPr lang="en-US" sz="1900" dirty="0" smtClean="0"/>
               <a:t>: </a:t>
             </a:r>
             <a:r>
-              <a:rPr lang="en-US" sz="2000" dirty="0" err="1" smtClean="0"/>
+              <a:rPr lang="en-US" sz="1900" dirty="0" err="1" smtClean="0"/>
               <a:t>rd</a:t>
             </a:r>
             <a:r>
-              <a:rPr lang="en-US" sz="2000" dirty="0" smtClean="0"/>
+              <a:rPr lang="en-US" sz="1900" dirty="0" smtClean="0"/>
               <a:t> (temp), </a:t>
             </a:r>
             <a:r>
-              <a:rPr lang="en-US" sz="2000" dirty="0" err="1" smtClean="0"/>
+              <a:rPr lang="en-US" sz="1900" dirty="0" err="1" smtClean="0"/>
               <a:t>rs</a:t>
             </a:r>
             <a:r>
-              <a:rPr lang="en-US" sz="2000" dirty="0" smtClean="0"/>
+              <a:rPr lang="en-US" sz="1900" dirty="0" smtClean="0"/>
               <a:t> (</a:t>
             </a:r>
             <a:r>
-              <a:rPr lang="en-US" sz="2000" dirty="0" err="1" smtClean="0"/>
+              <a:rPr lang="en-US" sz="1900" dirty="0" err="1" smtClean="0"/>
               <a:t>int</a:t>
             </a:r>
             <a:r>
-              <a:rPr lang="en-US" sz="2000" dirty="0" smtClean="0"/>
+              <a:rPr lang="en-US" sz="1900" dirty="0" smtClean="0"/>
               <a:t>)</a:t>
             </a:r>
           </a:p>
           <a:p>
             <a:pPr lvl="1"/>
             <a:r>
-              <a:rPr lang="en-US" sz="2000" dirty="0" smtClean="0"/>
+              <a:rPr lang="en-US" sz="1900" dirty="0" smtClean="0"/>
               <a:t>Jump: s1 (temp), s2 (temp), </a:t>
             </a:r>
             <a:r>
-              <a:rPr lang="en-US" sz="2000" dirty="0" err="1" smtClean="0"/>
+              <a:rPr lang="en-US" sz="1900" dirty="0" err="1" smtClean="0"/>
               <a:t>label_ir</a:t>
             </a:r>
             <a:r>
-              <a:rPr lang="en-US" sz="2000" dirty="0" smtClean="0"/>
+              <a:rPr lang="en-US" sz="1900" dirty="0" smtClean="0"/>
               <a:t> (</a:t>
             </a:r>
             <a:r>
-              <a:rPr lang="en-US" sz="2000" dirty="0" err="1" smtClean="0"/>
+              <a:rPr lang="en-US" sz="1900" dirty="0" err="1" smtClean="0"/>
               <a:t>ir</a:t>
             </a:r>
             <a:r>
-              <a:rPr lang="en-US" sz="2000" dirty="0" smtClean="0"/>
+              <a:rPr lang="en-US" sz="1900" dirty="0" smtClean="0"/>
               <a:t>)</a:t>
             </a:r>
+          </a:p>
+          <a:p>
+            <a:pPr lvl="1"/>
+            <a:r>
+              <a:rPr lang="en-US" sz="1900" dirty="0" smtClean="0"/>
+              <a:t>Call: </a:t>
+            </a:r>
+            <a:r>
+              <a:rPr lang="en-US" sz="1900" dirty="0" err="1" smtClean="0"/>
+              <a:t>ra</a:t>
+            </a:r>
+            <a:r>
+              <a:rPr lang="en-US" sz="1900" dirty="0" smtClean="0"/>
+              <a:t> (temp), function (symbol)</a:t>
+            </a:r>
+          </a:p>
+          <a:p>
+            <a:pPr lvl="1"/>
+            <a:r>
+              <a:rPr lang="en-US" sz="1900" dirty="0" err="1" smtClean="0"/>
+              <a:t>Misc</a:t>
+            </a:r>
+            <a:r>
+              <a:rPr lang="en-US" sz="1900" dirty="0" smtClean="0"/>
+              <a:t>: </a:t>
+            </a:r>
+            <a:r>
+              <a:rPr lang="en-US" sz="1900" dirty="0" err="1" smtClean="0"/>
+              <a:t>Nop</a:t>
+            </a:r>
+            <a:r>
+              <a:rPr lang="en-US" sz="1900" dirty="0" smtClean="0"/>
+              <a:t>, </a:t>
+            </a:r>
+            <a:r>
+              <a:rPr lang="en-US" sz="1900" dirty="0" err="1" smtClean="0"/>
+              <a:t>LoadString</a:t>
+            </a:r>
+            <a:r>
+              <a:rPr lang="en-US" sz="1900" dirty="0" smtClean="0"/>
+              <a:t>, </a:t>
+            </a:r>
+            <a:r>
+              <a:rPr lang="en-US" sz="1900" dirty="0" err="1" smtClean="0"/>
+              <a:t>ReadInt</a:t>
+            </a:r>
+            <a:r>
+              <a:rPr lang="en-US" sz="1900" dirty="0" smtClean="0"/>
+              <a:t>, </a:t>
+            </a:r>
+            <a:r>
+              <a:rPr lang="en-US" sz="1900" dirty="0" err="1" smtClean="0"/>
+              <a:t>etc</a:t>
+            </a:r>
+            <a:endParaRPr lang="en-US" sz="1900" dirty="0" smtClean="0"/>
           </a:p>
           <a:p>
             <a:r>

</xml_diff>